<commit_message>
Updated slides with more EDA and an introduction
</commit_message>
<xml_diff>
--- a/Case Study Presentation.pptx
+++ b/Case Study Presentation.pptx
@@ -6,20 +6,22 @@
     <p:sldMasterId id="2147483650" r:id="rId2"/>
   </p:sldMasterIdLst>
   <p:notesMasterIdLst>
-    <p:notesMasterId r:id="rId11"/>
+    <p:notesMasterId r:id="rId13"/>
   </p:notesMasterIdLst>
   <p:handoutMasterIdLst>
-    <p:handoutMasterId r:id="rId12"/>
+    <p:handoutMasterId r:id="rId14"/>
   </p:handoutMasterIdLst>
   <p:sldIdLst>
     <p:sldId id="256" r:id="rId3"/>
-    <p:sldId id="257" r:id="rId4"/>
-    <p:sldId id="259" r:id="rId5"/>
-    <p:sldId id="260" r:id="rId6"/>
-    <p:sldId id="261" r:id="rId7"/>
-    <p:sldId id="262" r:id="rId8"/>
-    <p:sldId id="264" r:id="rId9"/>
-    <p:sldId id="263" r:id="rId10"/>
+    <p:sldId id="267" r:id="rId4"/>
+    <p:sldId id="266" r:id="rId5"/>
+    <p:sldId id="257" r:id="rId6"/>
+    <p:sldId id="259" r:id="rId7"/>
+    <p:sldId id="260" r:id="rId8"/>
+    <p:sldId id="261" r:id="rId9"/>
+    <p:sldId id="262" r:id="rId10"/>
+    <p:sldId id="264" r:id="rId11"/>
+    <p:sldId id="263" r:id="rId12"/>
   </p:sldIdLst>
   <p:sldSz cx="9144000" cy="5145088"/>
   <p:notesSz cx="6858000" cy="9144000"/>
@@ -847,7 +849,7 @@
             <a:fld id="{03E4BB97-EAEA-4D70-A3A8-884172BEF80C}" type="slidenum">
               <a:rPr lang="ru-RU" altLang="ru-RU" smtClean="0"/>
               <a:pPr/>
-              <a:t>7</a:t>
+              <a:t>9</a:t>
             </a:fld>
             <a:endParaRPr lang="ru-RU" altLang="ru-RU"/>
           </a:p>
@@ -932,7 +934,7 @@
             <a:fld id="{03E4BB97-EAEA-4D70-A3A8-884172BEF80C}" type="slidenum">
               <a:rPr lang="ru-RU" altLang="ru-RU" smtClean="0"/>
               <a:pPr/>
-              <a:t>8</a:t>
+              <a:t>10</a:t>
             </a:fld>
             <a:endParaRPr lang="ru-RU" altLang="ru-RU"/>
           </a:p>
@@ -7682,6 +7684,227 @@
 </p:sld>
 </file>
 
+<file path=ppt/slides/slide10.xml><?xml version="1.0" encoding="utf-8"?>
+<p:sld xmlns:a="http://schemas.openxmlformats.org/drawingml/2006/main" xmlns:r="http://schemas.openxmlformats.org/officeDocument/2006/relationships" xmlns:p="http://schemas.openxmlformats.org/presentationml/2006/main">
+  <p:cSld>
+    <p:spTree>
+      <p:nvGrpSpPr>
+        <p:cNvPr id="1" name=""/>
+        <p:cNvGrpSpPr/>
+        <p:nvPr/>
+      </p:nvGrpSpPr>
+      <p:grpSpPr>
+        <a:xfrm>
+          <a:off x="0" y="0"/>
+          <a:ext cx="0" cy="0"/>
+          <a:chOff x="0" y="0"/>
+          <a:chExt cx="0" cy="0"/>
+        </a:xfrm>
+      </p:grpSpPr>
+      <p:sp>
+        <p:nvSpPr>
+          <p:cNvPr id="2" name="Title 1">
+            <a:extLst>
+              <a:ext uri="{FF2B5EF4-FFF2-40B4-BE49-F238E27FC236}">
+                <a16:creationId xmlns:a16="http://schemas.microsoft.com/office/drawing/2014/main" id="{E6CB76A2-299C-4ABB-B7F4-A23BB2C099A3}"/>
+              </a:ext>
+            </a:extLst>
+          </p:cNvPr>
+          <p:cNvSpPr>
+            <a:spLocks noGrp="1"/>
+          </p:cNvSpPr>
+          <p:nvPr>
+            <p:ph type="title"/>
+          </p:nvPr>
+        </p:nvSpPr>
+        <p:spPr/>
+        <p:txBody>
+          <a:bodyPr wrap="square" anchor="ctr">
+            <a:normAutofit/>
+          </a:bodyPr>
+          <a:lstStyle/>
+          <a:p>
+            <a:r>
+              <a:rPr lang="en-US" dirty="0"/>
+              <a:t>Results and Future Work</a:t>
+            </a:r>
+          </a:p>
+        </p:txBody>
+      </p:sp>
+      <p:sp>
+        <p:nvSpPr>
+          <p:cNvPr id="17" name="Content Placeholder 2">
+            <a:extLst>
+              <a:ext uri="{FF2B5EF4-FFF2-40B4-BE49-F238E27FC236}">
+                <a16:creationId xmlns:a16="http://schemas.microsoft.com/office/drawing/2014/main" id="{C415E7E0-716A-43A1-A469-614B9BF9C1F7}"/>
+              </a:ext>
+            </a:extLst>
+          </p:cNvPr>
+          <p:cNvSpPr>
+            <a:spLocks noGrp="1"/>
+          </p:cNvSpPr>
+          <p:nvPr>
+            <p:ph sz="half" idx="1"/>
+          </p:nvPr>
+        </p:nvSpPr>
+        <p:spPr/>
+        <p:txBody>
+          <a:bodyPr/>
+          <a:lstStyle/>
+          <a:p>
+            <a:r>
+              <a:rPr lang="en-US" sz="1800" dirty="0"/>
+              <a:t>Results</a:t>
+            </a:r>
+          </a:p>
+          <a:p>
+            <a:pPr lvl="1"/>
+            <a:r>
+              <a:rPr lang="en-US" sz="1400" dirty="0"/>
+              <a:t>Tennessee has the largest estimated intercept</a:t>
+            </a:r>
+          </a:p>
+          <a:p>
+            <a:pPr lvl="2"/>
+            <a:r>
+              <a:rPr lang="en-US" sz="1000" dirty="0"/>
+              <a:t>n = 57</a:t>
+            </a:r>
+          </a:p>
+          <a:p>
+            <a:pPr lvl="1"/>
+            <a:r>
+              <a:rPr lang="en-US" sz="1400" dirty="0"/>
+              <a:t>California has the lowest estimated intercept</a:t>
+            </a:r>
+          </a:p>
+          <a:p>
+            <a:pPr lvl="2"/>
+            <a:r>
+              <a:rPr lang="en-US" sz="1000" dirty="0"/>
+              <a:t>n = 259</a:t>
+            </a:r>
+            <a:endParaRPr lang="en-US" sz="1800" dirty="0"/>
+          </a:p>
+          <a:p>
+            <a:r>
+              <a:rPr lang="en-US" sz="1800" dirty="0"/>
+              <a:t>Future work</a:t>
+            </a:r>
+          </a:p>
+          <a:p>
+            <a:pPr lvl="1"/>
+            <a:r>
+              <a:rPr lang="en-US" sz="1400" dirty="0"/>
+              <a:t>Interactions</a:t>
+            </a:r>
+          </a:p>
+          <a:p>
+            <a:pPr lvl="1"/>
+            <a:r>
+              <a:rPr lang="en-US" sz="1400" dirty="0"/>
+              <a:t>Attempt to address violated assumptions</a:t>
+            </a:r>
+          </a:p>
+        </p:txBody>
+      </p:sp>
+      <p:sp>
+        <p:nvSpPr>
+          <p:cNvPr id="4" name="Slide Number Placeholder 3">
+            <a:extLst>
+              <a:ext uri="{FF2B5EF4-FFF2-40B4-BE49-F238E27FC236}">
+                <a16:creationId xmlns:a16="http://schemas.microsoft.com/office/drawing/2014/main" id="{05EDCFC6-B53C-4423-87DE-67A1B4861055}"/>
+              </a:ext>
+            </a:extLst>
+          </p:cNvPr>
+          <p:cNvSpPr>
+            <a:spLocks noGrp="1"/>
+          </p:cNvSpPr>
+          <p:nvPr>
+            <p:ph type="sldNum" sz="quarter" idx="12"/>
+          </p:nvPr>
+        </p:nvSpPr>
+        <p:spPr/>
+        <p:txBody>
+          <a:bodyPr wrap="square" anchor="t">
+            <a:normAutofit/>
+          </a:bodyPr>
+          <a:lstStyle/>
+          <a:p>
+            <a:pPr>
+              <a:lnSpc>
+                <a:spcPct val="90000"/>
+              </a:lnSpc>
+              <a:spcAft>
+                <a:spcPts val="600"/>
+              </a:spcAft>
+            </a:pPr>
+            <a:fld id="{4A93A190-6B22-4869-92A4-33F4DC54B357}" type="slidenum">
+              <a:rPr lang="ru-RU" altLang="ru-RU" sz="700" smtClean="0"/>
+              <a:pPr>
+                <a:lnSpc>
+                  <a:spcPct val="90000"/>
+                </a:lnSpc>
+                <a:spcAft>
+                  <a:spcPts val="600"/>
+                </a:spcAft>
+              </a:pPr>
+              <a:t>10</a:t>
+            </a:fld>
+            <a:endParaRPr lang="ru-RU" altLang="ru-RU" sz="700"/>
+          </a:p>
+        </p:txBody>
+      </p:sp>
+      <p:pic>
+        <p:nvPicPr>
+          <p:cNvPr id="12" name="Picture 11" descr="Chart&#10;&#10;Description automatically generated">
+            <a:extLst>
+              <a:ext uri="{FF2B5EF4-FFF2-40B4-BE49-F238E27FC236}">
+                <a16:creationId xmlns:a16="http://schemas.microsoft.com/office/drawing/2014/main" id="{6F6E8048-84FE-40E0-A553-98BB4E1391FB}"/>
+              </a:ext>
+            </a:extLst>
+          </p:cNvPr>
+          <p:cNvPicPr>
+            <a:picLocks noChangeAspect="1"/>
+          </p:cNvPicPr>
+          <p:nvPr/>
+        </p:nvPicPr>
+        <p:blipFill>
+          <a:blip r:embed="rId3">
+            <a:extLst>
+              <a:ext uri="{28A0092B-C50C-407E-A947-70E740481C1C}">
+                <a14:useLocalDpi xmlns:a14="http://schemas.microsoft.com/office/drawing/2010/main" val="0"/>
+              </a:ext>
+            </a:extLst>
+          </a:blip>
+          <a:stretch>
+            <a:fillRect/>
+          </a:stretch>
+        </p:blipFill>
+        <p:spPr>
+          <a:xfrm>
+            <a:off x="4932363" y="876660"/>
+            <a:ext cx="2958083" cy="4052168"/>
+          </a:xfrm>
+          <a:prstGeom prst="rect">
+            <a:avLst/>
+          </a:prstGeom>
+          <a:noFill/>
+        </p:spPr>
+      </p:pic>
+    </p:spTree>
+    <p:extLst>
+      <p:ext uri="{BB962C8B-B14F-4D97-AF65-F5344CB8AC3E}">
+        <p14:creationId xmlns:p14="http://schemas.microsoft.com/office/powerpoint/2010/main" val="1427774978"/>
+      </p:ext>
+    </p:extLst>
+  </p:cSld>
+  <p:clrMapOvr>
+    <a:masterClrMapping/>
+  </p:clrMapOvr>
+</p:sld>
+</file>
+
 <file path=ppt/slides/slide2.xml><?xml version="1.0" encoding="utf-8"?>
 <p:sld xmlns:a="http://schemas.openxmlformats.org/drawingml/2006/main" xmlns:r="http://schemas.openxmlformats.org/officeDocument/2006/relationships" xmlns:p="http://schemas.openxmlformats.org/presentationml/2006/main">
   <p:cSld>
@@ -7701,40 +7924,202 @@
       </p:grpSpPr>
       <p:sp>
         <p:nvSpPr>
-          <p:cNvPr id="36866" name="Rectangle 2"/>
-          <p:cNvSpPr>
-            <a:spLocks noGrp="1" noChangeArrowheads="1"/>
+          <p:cNvPr id="2" name="Title 1">
+            <a:extLst>
+              <a:ext uri="{FF2B5EF4-FFF2-40B4-BE49-F238E27FC236}">
+                <a16:creationId xmlns:a16="http://schemas.microsoft.com/office/drawing/2014/main" id="{CE43334F-AAB8-4B0E-803E-9A0FFF9B7DF5}"/>
+              </a:ext>
+            </a:extLst>
+          </p:cNvPr>
+          <p:cNvSpPr>
+            <a:spLocks noGrp="1"/>
           </p:cNvSpPr>
           <p:nvPr>
             <p:ph type="title"/>
           </p:nvPr>
         </p:nvSpPr>
-        <p:spPr>
-          <a:xfrm>
-            <a:off x="468313" y="123825"/>
-            <a:ext cx="8207375" cy="866775"/>
-          </a:xfrm>
-        </p:spPr>
-        <p:txBody>
-          <a:bodyPr wrap="square" anchor="ctr">
-            <a:normAutofit/>
-          </a:bodyPr>
+        <p:spPr/>
+        <p:txBody>
+          <a:bodyPr/>
           <a:lstStyle/>
           <a:p>
             <a:r>
-              <a:rPr lang="en-US" altLang="ru-RU" dirty="0"/>
+              <a:rPr lang="en-US" dirty="0"/>
+              <a:t>Introduction</a:t>
+            </a:r>
+          </a:p>
+        </p:txBody>
+      </p:sp>
+      <p:sp>
+        <p:nvSpPr>
+          <p:cNvPr id="3" name="Content Placeholder 2">
+            <a:extLst>
+              <a:ext uri="{FF2B5EF4-FFF2-40B4-BE49-F238E27FC236}">
+                <a16:creationId xmlns:a16="http://schemas.microsoft.com/office/drawing/2014/main" id="{3C39A333-22AE-48EE-988B-E0336F7D490E}"/>
+              </a:ext>
+            </a:extLst>
+          </p:cNvPr>
+          <p:cNvSpPr>
+            <a:spLocks noGrp="1"/>
+          </p:cNvSpPr>
+          <p:nvPr>
+            <p:ph idx="1"/>
+          </p:nvPr>
+        </p:nvSpPr>
+        <p:spPr/>
+        <p:txBody>
+          <a:bodyPr/>
+          <a:lstStyle/>
+          <a:p>
+            <a:r>
+              <a:rPr lang="en-US" dirty="0"/>
+              <a:t>Our drug of interest is Morphine</a:t>
+            </a:r>
+          </a:p>
+          <a:p>
+            <a:pPr lvl="1"/>
+            <a:r>
+              <a:rPr lang="en-US" dirty="0"/>
+              <a:t>Used to relieve moderate to severe pain</a:t>
+            </a:r>
+          </a:p>
+          <a:p>
+            <a:pPr lvl="1"/>
+            <a:r>
+              <a:rPr lang="en-US" dirty="0"/>
+              <a:t>May be habit forming, especially with prolonged use </a:t>
+            </a:r>
+            <a:r>
+              <a:rPr lang="en-US" sz="1100" dirty="0"/>
+              <a:t>(MedlinePlus)</a:t>
+            </a:r>
+          </a:p>
+          <a:p>
+            <a:r>
+              <a:rPr lang="en-US" dirty="0"/>
+              <a:t>Aim of this study is to explore the relationship between the sale price per milligram of the diverted pharmaceutical substance Morphine and other reported factors</a:t>
+            </a:r>
+          </a:p>
+          <a:p>
+            <a:pPr lvl="1"/>
+            <a:r>
+              <a:rPr lang="en-US" dirty="0"/>
+              <a:t>Location, reason for purchasing, time of purchase, </a:t>
+            </a:r>
+            <a:r>
+              <a:rPr lang="en-US" dirty="0" err="1"/>
+              <a:t>etc</a:t>
+            </a:r>
+            <a:endParaRPr lang="en-US" dirty="0"/>
+          </a:p>
+          <a:p>
+            <a:pPr lvl="1"/>
+            <a:r>
+              <a:rPr lang="en-US" dirty="0"/>
+              <a:t>Data source: </a:t>
+            </a:r>
+            <a:r>
+              <a:rPr lang="en-US" dirty="0" err="1"/>
+              <a:t>StreetRx</a:t>
+            </a:r>
+            <a:endParaRPr lang="en-US" dirty="0"/>
+          </a:p>
+        </p:txBody>
+      </p:sp>
+      <p:sp>
+        <p:nvSpPr>
+          <p:cNvPr id="4" name="Slide Number Placeholder 3">
+            <a:extLst>
+              <a:ext uri="{FF2B5EF4-FFF2-40B4-BE49-F238E27FC236}">
+                <a16:creationId xmlns:a16="http://schemas.microsoft.com/office/drawing/2014/main" id="{AA2035DD-7C10-4CEE-9CC9-7873A20E1C30}"/>
+              </a:ext>
+            </a:extLst>
+          </p:cNvPr>
+          <p:cNvSpPr>
+            <a:spLocks noGrp="1"/>
+          </p:cNvSpPr>
+          <p:nvPr>
+            <p:ph type="sldNum" sz="quarter" idx="12"/>
+          </p:nvPr>
+        </p:nvSpPr>
+        <p:spPr/>
+        <p:txBody>
+          <a:bodyPr/>
+          <a:lstStyle/>
+          <a:p>
+            <a:fld id="{30D49CF5-CBD1-49E7-80D7-E91E624413D2}" type="slidenum">
+              <a:rPr lang="en-GB" altLang="ru-RU" smtClean="0"/>
+              <a:pPr/>
+              <a:t>2</a:t>
+            </a:fld>
+            <a:endParaRPr lang="en-GB" altLang="ru-RU"/>
+          </a:p>
+        </p:txBody>
+      </p:sp>
+    </p:spTree>
+    <p:extLst>
+      <p:ext uri="{BB962C8B-B14F-4D97-AF65-F5344CB8AC3E}">
+        <p14:creationId xmlns:p14="http://schemas.microsoft.com/office/powerpoint/2010/main" val="2627417747"/>
+      </p:ext>
+    </p:extLst>
+  </p:cSld>
+  <p:clrMapOvr>
+    <a:masterClrMapping/>
+  </p:clrMapOvr>
+</p:sld>
+</file>
+
+<file path=ppt/slides/slide3.xml><?xml version="1.0" encoding="utf-8"?>
+<p:sld xmlns:a="http://schemas.openxmlformats.org/drawingml/2006/main" xmlns:r="http://schemas.openxmlformats.org/officeDocument/2006/relationships" xmlns:p="http://schemas.openxmlformats.org/presentationml/2006/main">
+  <p:cSld>
+    <p:spTree>
+      <p:nvGrpSpPr>
+        <p:cNvPr id="1" name=""/>
+        <p:cNvGrpSpPr/>
+        <p:nvPr/>
+      </p:nvGrpSpPr>
+      <p:grpSpPr>
+        <a:xfrm>
+          <a:off x="0" y="0"/>
+          <a:ext cx="0" cy="0"/>
+          <a:chOff x="0" y="0"/>
+          <a:chExt cx="0" cy="0"/>
+        </a:xfrm>
+      </p:grpSpPr>
+      <p:sp>
+        <p:nvSpPr>
+          <p:cNvPr id="10" name="Title 9">
+            <a:extLst>
+              <a:ext uri="{FF2B5EF4-FFF2-40B4-BE49-F238E27FC236}">
+                <a16:creationId xmlns:a16="http://schemas.microsoft.com/office/drawing/2014/main" id="{7336173E-90F2-4BA8-BAB2-47445979BEFD}"/>
+              </a:ext>
+            </a:extLst>
+          </p:cNvPr>
+          <p:cNvSpPr>
+            <a:spLocks noGrp="1"/>
+          </p:cNvSpPr>
+          <p:nvPr>
+            <p:ph type="title"/>
+          </p:nvPr>
+        </p:nvSpPr>
+        <p:spPr/>
+        <p:txBody>
+          <a:bodyPr/>
+          <a:lstStyle/>
+          <a:p>
+            <a:r>
+              <a:rPr lang="en-US" dirty="0"/>
               <a:t>EDA</a:t>
             </a:r>
-            <a:endParaRPr lang="uk-UA" altLang="ru-RU" dirty="0"/>
           </a:p>
         </p:txBody>
       </p:sp>
       <p:pic>
         <p:nvPicPr>
-          <p:cNvPr id="10" name="Picture 9" descr="Chart, histogram&#10;&#10;Description automatically generated">
+          <p:cNvPr id="18" name="Picture 17" descr="Chart, histogram&#10;&#10;Description automatically generated">
             <a:extLst>
               <a:ext uri="{FF2B5EF4-FFF2-40B4-BE49-F238E27FC236}">
-                <a16:creationId xmlns:a16="http://schemas.microsoft.com/office/drawing/2014/main" id="{270360B1-254A-4068-8A86-157FDC5E8514}"/>
+                <a16:creationId xmlns:a16="http://schemas.microsoft.com/office/drawing/2014/main" id="{86642D9A-F2AB-4335-A7F8-524FF032148A}"/>
               </a:ext>
             </a:extLst>
           </p:cNvPr>
@@ -7757,8 +8142,8 @@
         </p:blipFill>
         <p:spPr>
           <a:xfrm>
-            <a:off x="428843" y="1208178"/>
-            <a:ext cx="4266387" cy="3413110"/>
+            <a:off x="1187624" y="1570942"/>
+            <a:ext cx="3815382" cy="3052306"/>
           </a:xfrm>
           <a:prstGeom prst="rect">
             <a:avLst/>
@@ -7766,6 +8151,233 @@
           <a:noFill/>
         </p:spPr>
       </p:pic>
+      <p:sp>
+        <p:nvSpPr>
+          <p:cNvPr id="20" name="Slide Number Placeholder 5">
+            <a:extLst>
+              <a:ext uri="{FF2B5EF4-FFF2-40B4-BE49-F238E27FC236}">
+                <a16:creationId xmlns:a16="http://schemas.microsoft.com/office/drawing/2014/main" id="{0493799F-ADCA-4146-8B85-20291DB35D11}"/>
+              </a:ext>
+            </a:extLst>
+          </p:cNvPr>
+          <p:cNvSpPr>
+            <a:spLocks noGrp="1"/>
+          </p:cNvSpPr>
+          <p:nvPr>
+            <p:ph type="sldNum" sz="quarter" idx="12"/>
+          </p:nvPr>
+        </p:nvSpPr>
+        <p:spPr>
+          <a:xfrm>
+            <a:off x="6553200" y="4787900"/>
+            <a:ext cx="2122488" cy="254000"/>
+          </a:xfrm>
+        </p:spPr>
+        <p:txBody>
+          <a:bodyPr wrap="square" anchor="t">
+            <a:normAutofit/>
+          </a:bodyPr>
+          <a:lstStyle/>
+          <a:p>
+            <a:pPr>
+              <a:spcAft>
+                <a:spcPts val="600"/>
+              </a:spcAft>
+            </a:pPr>
+            <a:fld id="{64F71E2E-9488-469D-9EB7-EC601DB754C9}" type="slidenum">
+              <a:rPr lang="en-GB" altLang="ru-RU"/>
+              <a:pPr>
+                <a:spcAft>
+                  <a:spcPts val="600"/>
+                </a:spcAft>
+              </a:pPr>
+              <a:t>3</a:t>
+            </a:fld>
+            <a:endParaRPr lang="en-GB" altLang="ru-RU"/>
+          </a:p>
+        </p:txBody>
+      </p:sp>
+      <p:pic>
+        <p:nvPicPr>
+          <p:cNvPr id="21" name="Picture 20" descr="Chart, box and whisker chart&#10;&#10;Description automatically generated">
+            <a:extLst>
+              <a:ext uri="{FF2B5EF4-FFF2-40B4-BE49-F238E27FC236}">
+                <a16:creationId xmlns:a16="http://schemas.microsoft.com/office/drawing/2014/main" id="{0F1D304E-D567-4184-9A7B-EF899337B709}"/>
+              </a:ext>
+            </a:extLst>
+          </p:cNvPr>
+          <p:cNvPicPr>
+            <a:picLocks noChangeAspect="1"/>
+          </p:cNvPicPr>
+          <p:nvPr/>
+        </p:nvPicPr>
+        <p:blipFill>
+          <a:blip r:embed="rId3">
+            <a:extLst>
+              <a:ext uri="{28A0092B-C50C-407E-A947-70E740481C1C}">
+                <a14:useLocalDpi xmlns:a14="http://schemas.microsoft.com/office/drawing/2010/main" val="0"/>
+              </a:ext>
+            </a:extLst>
+          </a:blip>
+          <a:stretch>
+            <a:fillRect/>
+          </a:stretch>
+        </p:blipFill>
+        <p:spPr>
+          <a:xfrm>
+            <a:off x="5107940" y="2481592"/>
+            <a:ext cx="3566160" cy="2139696"/>
+          </a:xfrm>
+          <a:prstGeom prst="rect">
+            <a:avLst/>
+          </a:prstGeom>
+        </p:spPr>
+      </p:pic>
+      <p:sp>
+        <p:nvSpPr>
+          <p:cNvPr id="22" name="TextBox 21">
+            <a:extLst>
+              <a:ext uri="{FF2B5EF4-FFF2-40B4-BE49-F238E27FC236}">
+                <a16:creationId xmlns:a16="http://schemas.microsoft.com/office/drawing/2014/main" id="{57EBD446-1223-416F-BB5B-09343B41E893}"/>
+              </a:ext>
+            </a:extLst>
+          </p:cNvPr>
+          <p:cNvSpPr txBox="1"/>
+          <p:nvPr/>
+        </p:nvSpPr>
+        <p:spPr>
+          <a:xfrm>
+            <a:off x="1331913" y="1232388"/>
+            <a:ext cx="3671093" cy="338554"/>
+          </a:xfrm>
+          <a:prstGeom prst="rect">
+            <a:avLst/>
+          </a:prstGeom>
+          <a:noFill/>
+        </p:spPr>
+        <p:txBody>
+          <a:bodyPr wrap="square" rtlCol="0">
+            <a:spAutoFit/>
+          </a:bodyPr>
+          <a:lstStyle/>
+          <a:p>
+            <a:pPr algn="ctr"/>
+            <a:r>
+              <a:rPr lang="en-US" sz="1600" dirty="0"/>
+              <a:t>Distribution of ppm and log(ppm)</a:t>
+            </a:r>
+          </a:p>
+        </p:txBody>
+      </p:sp>
+      <p:sp>
+        <p:nvSpPr>
+          <p:cNvPr id="23" name="TextBox 22">
+            <a:extLst>
+              <a:ext uri="{FF2B5EF4-FFF2-40B4-BE49-F238E27FC236}">
+                <a16:creationId xmlns:a16="http://schemas.microsoft.com/office/drawing/2014/main" id="{19E7EDF1-8C67-48BA-804B-5E079377B87A}"/>
+              </a:ext>
+            </a:extLst>
+          </p:cNvPr>
+          <p:cNvSpPr txBox="1"/>
+          <p:nvPr/>
+        </p:nvSpPr>
+        <p:spPr>
+          <a:xfrm>
+            <a:off x="5147295" y="1232388"/>
+            <a:ext cx="3457153" cy="861774"/>
+          </a:xfrm>
+          <a:prstGeom prst="rect">
+            <a:avLst/>
+          </a:prstGeom>
+          <a:noFill/>
+        </p:spPr>
+        <p:txBody>
+          <a:bodyPr wrap="square" rtlCol="0">
+            <a:spAutoFit/>
+          </a:bodyPr>
+          <a:lstStyle/>
+          <a:p>
+            <a:pPr marL="285750" indent="-285750">
+              <a:buFont typeface="Arial" panose="020B0604020202020204" pitchFamily="34" charset="0"/>
+              <a:buChar char="•"/>
+            </a:pPr>
+            <a:r>
+              <a:rPr lang="en-US" sz="1600" b="0" dirty="0"/>
+              <a:t>Strength = {low, medium, medium high, high}</a:t>
+            </a:r>
+          </a:p>
+          <a:p>
+            <a:pPr marL="285750" indent="-285750">
+              <a:buFont typeface="Arial" panose="020B0604020202020204" pitchFamily="34" charset="0"/>
+              <a:buChar char="•"/>
+            </a:pPr>
+            <a:r>
+              <a:rPr lang="en-US" sz="1600" b="0" dirty="0"/>
+              <a:t>Based on quantiles</a:t>
+            </a:r>
+          </a:p>
+        </p:txBody>
+      </p:sp>
+    </p:spTree>
+    <p:extLst>
+      <p:ext uri="{BB962C8B-B14F-4D97-AF65-F5344CB8AC3E}">
+        <p14:creationId xmlns:p14="http://schemas.microsoft.com/office/powerpoint/2010/main" val="761240088"/>
+      </p:ext>
+    </p:extLst>
+  </p:cSld>
+  <p:clrMapOvr>
+    <a:masterClrMapping/>
+  </p:clrMapOvr>
+</p:sld>
+</file>
+
+<file path=ppt/slides/slide4.xml><?xml version="1.0" encoding="utf-8"?>
+<p:sld xmlns:a="http://schemas.openxmlformats.org/drawingml/2006/main" xmlns:r="http://schemas.openxmlformats.org/officeDocument/2006/relationships" xmlns:p="http://schemas.openxmlformats.org/presentationml/2006/main">
+  <p:cSld>
+    <p:spTree>
+      <p:nvGrpSpPr>
+        <p:cNvPr id="1" name=""/>
+        <p:cNvGrpSpPr/>
+        <p:nvPr/>
+      </p:nvGrpSpPr>
+      <p:grpSpPr>
+        <a:xfrm>
+          <a:off x="0" y="0"/>
+          <a:ext cx="0" cy="0"/>
+          <a:chOff x="0" y="0"/>
+          <a:chExt cx="0" cy="0"/>
+        </a:xfrm>
+      </p:grpSpPr>
+      <p:sp>
+        <p:nvSpPr>
+          <p:cNvPr id="36866" name="Rectangle 2"/>
+          <p:cNvSpPr>
+            <a:spLocks noGrp="1" noChangeArrowheads="1"/>
+          </p:cNvSpPr>
+          <p:nvPr>
+            <p:ph type="title"/>
+          </p:nvPr>
+        </p:nvSpPr>
+        <p:spPr>
+          <a:xfrm>
+            <a:off x="468313" y="123825"/>
+            <a:ext cx="8207375" cy="866775"/>
+          </a:xfrm>
+        </p:spPr>
+        <p:txBody>
+          <a:bodyPr wrap="square" anchor="ctr">
+            <a:normAutofit/>
+          </a:bodyPr>
+          <a:lstStyle/>
+          <a:p>
+            <a:r>
+              <a:rPr lang="en-US" altLang="ru-RU" dirty="0"/>
+              <a:t>EDA</a:t>
+            </a:r>
+            <a:endParaRPr lang="uk-UA" altLang="ru-RU" dirty="0"/>
+          </a:p>
+        </p:txBody>
+      </p:sp>
       <p:graphicFrame>
         <p:nvGraphicFramePr>
           <p:cNvPr id="11" name="Table 11">
@@ -7782,14 +8394,14 @@
             <p:ph sz="half" idx="2"/>
             <p:extLst>
               <p:ext uri="{D42A27DB-BD31-4B8C-83A1-F6EECF244321}">
-                <p14:modId xmlns:p14="http://schemas.microsoft.com/office/powerpoint/2010/main" val="2284711973"/>
+                <p14:modId xmlns:p14="http://schemas.microsoft.com/office/powerpoint/2010/main" val="3464798231"/>
               </p:ext>
             </p:extLst>
           </p:nvPr>
         </p:nvGraphicFramePr>
         <p:xfrm>
-          <a:off x="4760372" y="1208178"/>
-          <a:ext cx="3954785" cy="1168400"/>
+          <a:off x="4788024" y="844352"/>
+          <a:ext cx="3767400" cy="1137920"/>
         </p:xfrm>
         <a:graphic>
           <a:graphicData uri="http://schemas.openxmlformats.org/drawingml/2006/table">
@@ -7798,35 +8410,35 @@
                 <a:tableStyleId>{5C22544A-7EE6-4342-B048-85BDC9FD1C3A}</a:tableStyleId>
               </a:tblPr>
               <a:tblGrid>
-                <a:gridCol w="790957">
+                <a:gridCol w="754245">
                   <a:extLst>
                     <a:ext uri="{9D8B030D-6E8A-4147-A177-3AD203B41FA5}">
                       <a16:colId xmlns:a16="http://schemas.microsoft.com/office/drawing/2014/main" val="302146966"/>
                     </a:ext>
                   </a:extLst>
                 </a:gridCol>
-                <a:gridCol w="790957">
+                <a:gridCol w="754245">
                   <a:extLst>
                     <a:ext uri="{9D8B030D-6E8A-4147-A177-3AD203B41FA5}">
                       <a16:colId xmlns:a16="http://schemas.microsoft.com/office/drawing/2014/main" val="1342235316"/>
                     </a:ext>
                   </a:extLst>
                 </a:gridCol>
-                <a:gridCol w="790957">
+                <a:gridCol w="754245">
                   <a:extLst>
                     <a:ext uri="{9D8B030D-6E8A-4147-A177-3AD203B41FA5}">
                       <a16:colId xmlns:a16="http://schemas.microsoft.com/office/drawing/2014/main" val="462483116"/>
                     </a:ext>
                   </a:extLst>
                 </a:gridCol>
-                <a:gridCol w="790957">
+                <a:gridCol w="754245">
                   <a:extLst>
                     <a:ext uri="{9D8B030D-6E8A-4147-A177-3AD203B41FA5}">
                       <a16:colId xmlns:a16="http://schemas.microsoft.com/office/drawing/2014/main" val="1085646157"/>
                     </a:ext>
                   </a:extLst>
                 </a:gridCol>
-                <a:gridCol w="790957">
+                <a:gridCol w="750420">
                   <a:extLst>
                     <a:ext uri="{9D8B030D-6E8A-4147-A177-3AD203B41FA5}">
                       <a16:colId xmlns:a16="http://schemas.microsoft.com/office/drawing/2014/main" val="336910824"/>
@@ -7907,7 +8519,7 @@
                     <a:p>
                       <a:pPr algn="ctr"/>
                       <a:r>
-                        <a:rPr lang="en-US" sz="1100" dirty="0"/>
+                        <a:rPr lang="en-US" sz="1000" dirty="0"/>
                         <a:t>North Dakota</a:t>
                       </a:r>
                     </a:p>
@@ -7921,7 +8533,7 @@
                     <a:p>
                       <a:pPr algn="ctr"/>
                       <a:r>
-                        <a:rPr lang="en-US" sz="1100" dirty="0"/>
+                        <a:rPr lang="en-US" sz="1000" dirty="0"/>
                         <a:t>Vermont</a:t>
                       </a:r>
                     </a:p>
@@ -7935,7 +8547,7 @@
                     <a:p>
                       <a:pPr algn="ctr"/>
                       <a:r>
-                        <a:rPr lang="en-US" sz="1100" dirty="0"/>
+                        <a:rPr lang="en-US" sz="1000" dirty="0"/>
                         <a:t>DC</a:t>
                       </a:r>
                     </a:p>
@@ -7949,7 +8561,7 @@
                     <a:p>
                       <a:pPr algn="ctr"/>
                       <a:r>
-                        <a:rPr lang="en-US" sz="1100" dirty="0"/>
+                        <a:rPr lang="en-US" sz="1000" dirty="0"/>
                         <a:t>Wyoming</a:t>
                       </a:r>
                     </a:p>
@@ -7963,7 +8575,7 @@
                     <a:p>
                       <a:pPr algn="ctr"/>
                       <a:r>
-                        <a:rPr lang="en-US" sz="1100" dirty="0"/>
+                        <a:rPr lang="en-US" sz="1000" dirty="0"/>
                         <a:t>Alaska</a:t>
                       </a:r>
                     </a:p>
@@ -8091,7 +8703,7 @@
                   <a:spcPts val="600"/>
                 </a:spcAft>
               </a:pPr>
-              <a:t>2</a:t>
+              <a:t>4</a:t>
             </a:fld>
             <a:endParaRPr lang="en-GB" altLang="ru-RU"/>
           </a:p>
@@ -8099,10 +8711,46 @@
       </p:sp>
       <p:pic>
         <p:nvPicPr>
-          <p:cNvPr id="3" name="Picture 2" descr="Chart, box and whisker chart&#10;&#10;Description automatically generated">
+          <p:cNvPr id="8" name="Picture 7" descr="Chart&#10;&#10;Description automatically generated">
             <a:extLst>
               <a:ext uri="{FF2B5EF4-FFF2-40B4-BE49-F238E27FC236}">
-                <a16:creationId xmlns:a16="http://schemas.microsoft.com/office/drawing/2014/main" id="{AE2B4A8B-30F6-47D6-A1F2-A932CF1F84CF}"/>
+                <a16:creationId xmlns:a16="http://schemas.microsoft.com/office/drawing/2014/main" id="{493870F7-F537-4BF4-9403-56BA92684CEC}"/>
+              </a:ext>
+            </a:extLst>
+          </p:cNvPr>
+          <p:cNvPicPr>
+            <a:picLocks noChangeAspect="1"/>
+          </p:cNvPicPr>
+          <p:nvPr/>
+        </p:nvPicPr>
+        <p:blipFill>
+          <a:blip r:embed="rId2">
+            <a:extLst>
+              <a:ext uri="{28A0092B-C50C-407E-A947-70E740481C1C}">
+                <a14:useLocalDpi xmlns:a14="http://schemas.microsoft.com/office/drawing/2010/main" val="0"/>
+              </a:ext>
+            </a:extLst>
+          </a:blip>
+          <a:stretch>
+            <a:fillRect/>
+          </a:stretch>
+        </p:blipFill>
+        <p:spPr>
+          <a:xfrm>
+            <a:off x="468312" y="2069851"/>
+            <a:ext cx="4756586" cy="2718049"/>
+          </a:xfrm>
+          <a:prstGeom prst="rect">
+            <a:avLst/>
+          </a:prstGeom>
+        </p:spPr>
+      </p:pic>
+      <p:pic>
+        <p:nvPicPr>
+          <p:cNvPr id="12" name="Picture 11" descr="Chart, box and whisker chart&#10;&#10;Description automatically generated">
+            <a:extLst>
+              <a:ext uri="{FF2B5EF4-FFF2-40B4-BE49-F238E27FC236}">
+                <a16:creationId xmlns:a16="http://schemas.microsoft.com/office/drawing/2014/main" id="{8DDCC76E-AD4F-488B-9E69-CDAE5ABAB834}"/>
               </a:ext>
             </a:extLst>
           </p:cNvPr>
@@ -8125,14 +8773,55 @@
         </p:blipFill>
         <p:spPr>
           <a:xfrm>
-            <a:off x="4954684" y="2481592"/>
-            <a:ext cx="3566160" cy="2139696"/>
+            <a:off x="5724128" y="2069852"/>
+            <a:ext cx="2831300" cy="2718048"/>
           </a:xfrm>
           <a:prstGeom prst="rect">
             <a:avLst/>
           </a:prstGeom>
         </p:spPr>
       </p:pic>
+      <p:sp>
+        <p:nvSpPr>
+          <p:cNvPr id="13" name="TextBox 12">
+            <a:extLst>
+              <a:ext uri="{FF2B5EF4-FFF2-40B4-BE49-F238E27FC236}">
+                <a16:creationId xmlns:a16="http://schemas.microsoft.com/office/drawing/2014/main" id="{9363100A-9C66-4731-A698-5D04B2A1259A}"/>
+              </a:ext>
+            </a:extLst>
+          </p:cNvPr>
+          <p:cNvSpPr txBox="1"/>
+          <p:nvPr/>
+        </p:nvSpPr>
+        <p:spPr>
+          <a:xfrm>
+            <a:off x="448617" y="1366421"/>
+            <a:ext cx="4339407" cy="646331"/>
+          </a:xfrm>
+          <a:prstGeom prst="rect">
+            <a:avLst/>
+          </a:prstGeom>
+          <a:noFill/>
+        </p:spPr>
+        <p:txBody>
+          <a:bodyPr wrap="square" rtlCol="0">
+            <a:spAutoFit/>
+          </a:bodyPr>
+          <a:lstStyle/>
+          <a:p>
+            <a:r>
+              <a:rPr lang="en-US" dirty="0"/>
+              <a:t>State Sample Size vs Mean log(ppm)</a:t>
+            </a:r>
+          </a:p>
+          <a:p>
+            <a:r>
+              <a:rPr lang="en-US" dirty="0"/>
+              <a:t>Boxplot of log(ppm) by State</a:t>
+            </a:r>
+          </a:p>
+        </p:txBody>
+      </p:sp>
     </p:spTree>
   </p:cSld>
   <p:clrMapOvr>
@@ -8141,7 +8830,7 @@
 </p:sld>
 </file>
 
-<file path=ppt/slides/slide3.xml><?xml version="1.0" encoding="utf-8"?>
+<file path=ppt/slides/slide5.xml><?xml version="1.0" encoding="utf-8"?>
 <p:sld xmlns:a="http://schemas.openxmlformats.org/drawingml/2006/main" xmlns:r="http://schemas.openxmlformats.org/officeDocument/2006/relationships" xmlns:p="http://schemas.openxmlformats.org/presentationml/2006/main">
   <p:cSld>
     <p:spTree>
@@ -8158,12 +8847,87 @@
           <a:chExt cx="0" cy="0"/>
         </a:xfrm>
       </p:grpSpPr>
+      <p:sp>
+        <p:nvSpPr>
+          <p:cNvPr id="6" name="Slide Number Placeholder 5"/>
+          <p:cNvSpPr>
+            <a:spLocks noGrp="1"/>
+          </p:cNvSpPr>
+          <p:nvPr>
+            <p:ph type="sldNum" sz="quarter" idx="12"/>
+          </p:nvPr>
+        </p:nvSpPr>
+        <p:spPr>
+          <a:xfrm>
+            <a:off x="6553200" y="4841875"/>
+            <a:ext cx="2133600" cy="200025"/>
+          </a:xfrm>
+        </p:spPr>
+        <p:txBody>
+          <a:bodyPr wrap="square" anchor="t">
+            <a:normAutofit/>
+          </a:bodyPr>
+          <a:lstStyle/>
+          <a:p>
+            <a:pPr>
+              <a:lnSpc>
+                <a:spcPct val="90000"/>
+              </a:lnSpc>
+              <a:spcAft>
+                <a:spcPts val="600"/>
+              </a:spcAft>
+            </a:pPr>
+            <a:fld id="{14F8EF02-1F24-4ABC-80E1-A30B7FBDC204}" type="slidenum">
+              <a:rPr lang="ru-RU" altLang="ru-RU" sz="700"/>
+              <a:pPr>
+                <a:lnSpc>
+                  <a:spcPct val="90000"/>
+                </a:lnSpc>
+                <a:spcAft>
+                  <a:spcPts val="600"/>
+                </a:spcAft>
+              </a:pPr>
+              <a:t>5</a:t>
+            </a:fld>
+            <a:endParaRPr lang="ru-RU" altLang="ru-RU" sz="700"/>
+          </a:p>
+        </p:txBody>
+      </p:sp>
+      <p:sp>
+        <p:nvSpPr>
+          <p:cNvPr id="195586" name="Rectangle 2"/>
+          <p:cNvSpPr>
+            <a:spLocks noGrp="1" noChangeArrowheads="1"/>
+          </p:cNvSpPr>
+          <p:nvPr>
+            <p:ph type="title"/>
+          </p:nvPr>
+        </p:nvSpPr>
+        <p:spPr>
+          <a:xfrm>
+            <a:off x="1331913" y="196850"/>
+            <a:ext cx="7342187" cy="857250"/>
+          </a:xfrm>
+        </p:spPr>
+        <p:txBody>
+          <a:bodyPr wrap="square" anchor="ctr">
+            <a:normAutofit/>
+          </a:bodyPr>
+          <a:lstStyle/>
+          <a:p>
+            <a:r>
+              <a:rPr lang="en-US" altLang="ru-RU" dirty="0"/>
+              <a:t>EDA</a:t>
+            </a:r>
+          </a:p>
+        </p:txBody>
+      </p:sp>
       <p:pic>
         <p:nvPicPr>
-          <p:cNvPr id="13" name="Picture 12" descr="Chart&#10;&#10;Description automatically generated">
+          <p:cNvPr id="3" name="Picture 2" descr="Chart, box and whisker chart&#10;&#10;Description automatically generated">
             <a:extLst>
               <a:ext uri="{FF2B5EF4-FFF2-40B4-BE49-F238E27FC236}">
-                <a16:creationId xmlns:a16="http://schemas.microsoft.com/office/drawing/2014/main" id="{75BB86FF-CD1A-4E6B-9837-C56073C72CE9}"/>
+                <a16:creationId xmlns:a16="http://schemas.microsoft.com/office/drawing/2014/main" id="{F17B3A96-FF7C-4B8C-AD12-F6973C4CF8FD}"/>
               </a:ext>
             </a:extLst>
           </p:cNvPr>
@@ -8186,8 +8950,8 @@
         </p:blipFill>
         <p:spPr>
           <a:xfrm>
-            <a:off x="1403648" y="1054100"/>
-            <a:ext cx="3853358" cy="2140336"/>
+            <a:off x="5750239" y="407315"/>
+            <a:ext cx="2231975" cy="2142696"/>
           </a:xfrm>
           <a:prstGeom prst="rect">
             <a:avLst/>
@@ -8196,10 +8960,10 @@
       </p:pic>
       <p:pic>
         <p:nvPicPr>
-          <p:cNvPr id="15" name="Picture 14" descr="Chart, box and whisker chart&#10;&#10;Description automatically generated">
+          <p:cNvPr id="5" name="Picture 4" descr="Chart, box and whisker chart&#10;&#10;Description automatically generated">
             <a:extLst>
               <a:ext uri="{FF2B5EF4-FFF2-40B4-BE49-F238E27FC236}">
-                <a16:creationId xmlns:a16="http://schemas.microsoft.com/office/drawing/2014/main" id="{F6E884E7-A191-4640-A5D5-D07AE15CC44E}"/>
+                <a16:creationId xmlns:a16="http://schemas.microsoft.com/office/drawing/2014/main" id="{64EAC76B-0E45-4CA4-A120-1643051064E1}"/>
               </a:ext>
             </a:extLst>
           </p:cNvPr>
@@ -8209,7 +8973,7 @@
           <p:nvPr/>
         </p:nvPicPr>
         <p:blipFill>
-          <a:blip r:embed="rId3" cstate="print">
+          <a:blip r:embed="rId3">
             <a:extLst>
               <a:ext uri="{28A0092B-C50C-407E-A947-70E740481C1C}">
                 <a14:useLocalDpi xmlns:a14="http://schemas.microsoft.com/office/drawing/2010/main" val="0"/>
@@ -8222,8 +8986,8 @@
         </p:blipFill>
         <p:spPr>
           <a:xfrm>
-            <a:off x="1407394" y="3218222"/>
-            <a:ext cx="1903298" cy="1823678"/>
+            <a:off x="5750239" y="2595882"/>
+            <a:ext cx="2231136" cy="2141891"/>
           </a:xfrm>
           <a:prstGeom prst="rect">
             <a:avLst/>
@@ -8232,10 +8996,10 @@
       </p:pic>
       <p:pic>
         <p:nvPicPr>
-          <p:cNvPr id="17" name="Picture 16" descr="Chart, box and whisker chart&#10;&#10;Description automatically generated">
+          <p:cNvPr id="8" name="Picture 7" descr="Chart&#10;&#10;Description automatically generated">
             <a:extLst>
               <a:ext uri="{FF2B5EF4-FFF2-40B4-BE49-F238E27FC236}">
-                <a16:creationId xmlns:a16="http://schemas.microsoft.com/office/drawing/2014/main" id="{4A2216A2-BC38-40D4-9C4A-3D3BC18B2E79}"/>
+                <a16:creationId xmlns:a16="http://schemas.microsoft.com/office/drawing/2014/main" id="{F46406F9-F0FD-4E58-9501-9F2AF316381B}"/>
               </a:ext>
             </a:extLst>
           </p:cNvPr>
@@ -8245,7 +9009,7 @@
           <p:nvPr/>
         </p:nvPicPr>
         <p:blipFill>
-          <a:blip r:embed="rId4" cstate="print">
+          <a:blip r:embed="rId4">
             <a:extLst>
               <a:ext uri="{28A0092B-C50C-407E-A947-70E740481C1C}">
                 <a14:useLocalDpi xmlns:a14="http://schemas.microsoft.com/office/drawing/2010/main" val="0"/>
@@ -8258,125 +9022,14 @@
         </p:blipFill>
         <p:spPr>
           <a:xfrm>
-            <a:off x="3353708" y="3218222"/>
-            <a:ext cx="1903298" cy="1823678"/>
+            <a:off x="1331913" y="1054100"/>
+            <a:ext cx="4032175" cy="3870888"/>
           </a:xfrm>
           <a:prstGeom prst="rect">
             <a:avLst/>
           </a:prstGeom>
         </p:spPr>
       </p:pic>
-      <p:pic>
-        <p:nvPicPr>
-          <p:cNvPr id="19" name="Picture 18" descr="Chart&#10;&#10;Description automatically generated">
-            <a:extLst>
-              <a:ext uri="{FF2B5EF4-FFF2-40B4-BE49-F238E27FC236}">
-                <a16:creationId xmlns:a16="http://schemas.microsoft.com/office/drawing/2014/main" id="{54E6E130-A051-4624-93B2-0CD09F70D1AD}"/>
-              </a:ext>
-            </a:extLst>
-          </p:cNvPr>
-          <p:cNvPicPr>
-            <a:picLocks noChangeAspect="1"/>
-          </p:cNvPicPr>
-          <p:nvPr/>
-        </p:nvPicPr>
-        <p:blipFill>
-          <a:blip r:embed="rId5">
-            <a:extLst>
-              <a:ext uri="{28A0092B-C50C-407E-A947-70E740481C1C}">
-                <a14:useLocalDpi xmlns:a14="http://schemas.microsoft.com/office/drawing/2010/main" val="0"/>
-              </a:ext>
-            </a:extLst>
-          </a:blip>
-          <a:stretch>
-            <a:fillRect/>
-          </a:stretch>
-        </p:blipFill>
-        <p:spPr>
-          <a:xfrm>
-            <a:off x="5364088" y="1163277"/>
-            <a:ext cx="3154522" cy="3025737"/>
-          </a:xfrm>
-          <a:prstGeom prst="rect">
-            <a:avLst/>
-          </a:prstGeom>
-        </p:spPr>
-      </p:pic>
-      <p:sp>
-        <p:nvSpPr>
-          <p:cNvPr id="6" name="Slide Number Placeholder 5"/>
-          <p:cNvSpPr>
-            <a:spLocks noGrp="1"/>
-          </p:cNvSpPr>
-          <p:nvPr>
-            <p:ph type="sldNum" sz="quarter" idx="12"/>
-          </p:nvPr>
-        </p:nvSpPr>
-        <p:spPr>
-          <a:xfrm>
-            <a:off x="6553200" y="4841875"/>
-            <a:ext cx="2133600" cy="200025"/>
-          </a:xfrm>
-        </p:spPr>
-        <p:txBody>
-          <a:bodyPr wrap="square" anchor="t">
-            <a:normAutofit/>
-          </a:bodyPr>
-          <a:lstStyle/>
-          <a:p>
-            <a:pPr>
-              <a:lnSpc>
-                <a:spcPct val="90000"/>
-              </a:lnSpc>
-              <a:spcAft>
-                <a:spcPts val="600"/>
-              </a:spcAft>
-            </a:pPr>
-            <a:fld id="{14F8EF02-1F24-4ABC-80E1-A30B7FBDC204}" type="slidenum">
-              <a:rPr lang="ru-RU" altLang="ru-RU" sz="700"/>
-              <a:pPr>
-                <a:lnSpc>
-                  <a:spcPct val="90000"/>
-                </a:lnSpc>
-                <a:spcAft>
-                  <a:spcPts val="600"/>
-                </a:spcAft>
-              </a:pPr>
-              <a:t>3</a:t>
-            </a:fld>
-            <a:endParaRPr lang="ru-RU" altLang="ru-RU" sz="700"/>
-          </a:p>
-        </p:txBody>
-      </p:sp>
-      <p:sp>
-        <p:nvSpPr>
-          <p:cNvPr id="195586" name="Rectangle 2"/>
-          <p:cNvSpPr>
-            <a:spLocks noGrp="1" noChangeArrowheads="1"/>
-          </p:cNvSpPr>
-          <p:nvPr>
-            <p:ph type="title"/>
-          </p:nvPr>
-        </p:nvSpPr>
-        <p:spPr>
-          <a:xfrm>
-            <a:off x="1331913" y="196850"/>
-            <a:ext cx="7342187" cy="857250"/>
-          </a:xfrm>
-        </p:spPr>
-        <p:txBody>
-          <a:bodyPr wrap="square" anchor="ctr">
-            <a:normAutofit/>
-          </a:bodyPr>
-          <a:lstStyle/>
-          <a:p>
-            <a:r>
-              <a:rPr lang="en-US" altLang="ru-RU" dirty="0"/>
-              <a:t>EDA</a:t>
-            </a:r>
-          </a:p>
-        </p:txBody>
-      </p:sp>
     </p:spTree>
   </p:cSld>
   <p:clrMapOvr>
@@ -8385,7 +9038,7 @@
 </p:sld>
 </file>
 
-<file path=ppt/slides/slide4.xml><?xml version="1.0" encoding="utf-8"?>
+<file path=ppt/slides/slide6.xml><?xml version="1.0" encoding="utf-8"?>
 <p:sld xmlns:a="http://schemas.openxmlformats.org/drawingml/2006/main" xmlns:r="http://schemas.openxmlformats.org/officeDocument/2006/relationships" xmlns:p="http://schemas.openxmlformats.org/presentationml/2006/main">
   <p:cSld>
     <p:spTree>
@@ -9160,7 +9813,7 @@
             <a:fld id="{30D49CF5-CBD1-49E7-80D7-E91E624413D2}" type="slidenum">
               <a:rPr lang="en-GB" altLang="ru-RU" smtClean="0"/>
               <a:pPr/>
-              <a:t>4</a:t>
+              <a:t>6</a:t>
             </a:fld>
             <a:endParaRPr lang="en-GB" altLang="ru-RU"/>
           </a:p>
@@ -9179,7 +9832,7 @@
 </p:sld>
 </file>
 
-<file path=ppt/slides/slide5.xml><?xml version="1.0" encoding="utf-8"?>
+<file path=ppt/slides/slide7.xml><?xml version="1.0" encoding="utf-8"?>
 <p:sld xmlns:a="http://schemas.openxmlformats.org/drawingml/2006/main" xmlns:r="http://schemas.openxmlformats.org/officeDocument/2006/relationships" xmlns:p="http://schemas.openxmlformats.org/presentationml/2006/main">
   <p:cSld>
     <p:spTree>
@@ -9850,7 +10503,7 @@
                   <a:spcPts val="600"/>
                 </a:spcAft>
               </a:pPr>
-              <a:t>5</a:t>
+              <a:t>7</a:t>
             </a:fld>
             <a:endParaRPr lang="ru-RU" altLang="ru-RU" sz="700"/>
           </a:p>
@@ -9869,7 +10522,7 @@
 </p:sld>
 </file>
 
-<file path=ppt/slides/slide6.xml><?xml version="1.0" encoding="utf-8"?>
+<file path=ppt/slides/slide8.xml><?xml version="1.0" encoding="utf-8"?>
 <p:sld xmlns:a="http://schemas.openxmlformats.org/drawingml/2006/main" xmlns:r="http://schemas.openxmlformats.org/officeDocument/2006/relationships" xmlns:p="http://schemas.openxmlformats.org/presentationml/2006/main">
   <p:cSld>
     <p:spTree>
@@ -10101,7 +10754,7 @@
                   <a:spcPts val="600"/>
                 </a:spcAft>
               </a:pPr>
-              <a:t>6</a:t>
+              <a:t>8</a:t>
             </a:fld>
             <a:endParaRPr lang="en-GB" altLang="ru-RU"/>
           </a:p>
@@ -10120,7 +10773,7 @@
 </p:sld>
 </file>
 
-<file path=ppt/slides/slide7.xml><?xml version="1.0" encoding="utf-8"?>
+<file path=ppt/slides/slide9.xml><?xml version="1.0" encoding="utf-8"?>
 <p:sld xmlns:a="http://schemas.openxmlformats.org/drawingml/2006/main" xmlns:r="http://schemas.openxmlformats.org/officeDocument/2006/relationships" xmlns:p="http://schemas.openxmlformats.org/presentationml/2006/main">
   <p:cSld>
     <p:spTree>
@@ -10308,7 +10961,7 @@
             <a:fld id="{547D8D4D-52BC-42F7-833A-88303EA3A3C2}" type="slidenum">
               <a:rPr lang="ru-RU" altLang="ru-RU" smtClean="0"/>
               <a:pPr/>
-              <a:t>7</a:t>
+              <a:t>9</a:t>
             </a:fld>
             <a:endParaRPr lang="ru-RU" altLang="ru-RU"/>
           </a:p>
@@ -10318,227 +10971,6 @@
     <p:extLst>
       <p:ext uri="{BB962C8B-B14F-4D97-AF65-F5344CB8AC3E}">
         <p14:creationId xmlns:p14="http://schemas.microsoft.com/office/powerpoint/2010/main" val="3944011146"/>
-      </p:ext>
-    </p:extLst>
-  </p:cSld>
-  <p:clrMapOvr>
-    <a:masterClrMapping/>
-  </p:clrMapOvr>
-</p:sld>
-</file>
-
-<file path=ppt/slides/slide8.xml><?xml version="1.0" encoding="utf-8"?>
-<p:sld xmlns:a="http://schemas.openxmlformats.org/drawingml/2006/main" xmlns:r="http://schemas.openxmlformats.org/officeDocument/2006/relationships" xmlns:p="http://schemas.openxmlformats.org/presentationml/2006/main">
-  <p:cSld>
-    <p:spTree>
-      <p:nvGrpSpPr>
-        <p:cNvPr id="1" name=""/>
-        <p:cNvGrpSpPr/>
-        <p:nvPr/>
-      </p:nvGrpSpPr>
-      <p:grpSpPr>
-        <a:xfrm>
-          <a:off x="0" y="0"/>
-          <a:ext cx="0" cy="0"/>
-          <a:chOff x="0" y="0"/>
-          <a:chExt cx="0" cy="0"/>
-        </a:xfrm>
-      </p:grpSpPr>
-      <p:sp>
-        <p:nvSpPr>
-          <p:cNvPr id="2" name="Title 1">
-            <a:extLst>
-              <a:ext uri="{FF2B5EF4-FFF2-40B4-BE49-F238E27FC236}">
-                <a16:creationId xmlns:a16="http://schemas.microsoft.com/office/drawing/2014/main" id="{E6CB76A2-299C-4ABB-B7F4-A23BB2C099A3}"/>
-              </a:ext>
-            </a:extLst>
-          </p:cNvPr>
-          <p:cNvSpPr>
-            <a:spLocks noGrp="1"/>
-          </p:cNvSpPr>
-          <p:nvPr>
-            <p:ph type="title"/>
-          </p:nvPr>
-        </p:nvSpPr>
-        <p:spPr/>
-        <p:txBody>
-          <a:bodyPr wrap="square" anchor="ctr">
-            <a:normAutofit/>
-          </a:bodyPr>
-          <a:lstStyle/>
-          <a:p>
-            <a:r>
-              <a:rPr lang="en-US" dirty="0"/>
-              <a:t>Results and Future Work</a:t>
-            </a:r>
-          </a:p>
-        </p:txBody>
-      </p:sp>
-      <p:sp>
-        <p:nvSpPr>
-          <p:cNvPr id="17" name="Content Placeholder 2">
-            <a:extLst>
-              <a:ext uri="{FF2B5EF4-FFF2-40B4-BE49-F238E27FC236}">
-                <a16:creationId xmlns:a16="http://schemas.microsoft.com/office/drawing/2014/main" id="{C415E7E0-716A-43A1-A469-614B9BF9C1F7}"/>
-              </a:ext>
-            </a:extLst>
-          </p:cNvPr>
-          <p:cNvSpPr>
-            <a:spLocks noGrp="1"/>
-          </p:cNvSpPr>
-          <p:nvPr>
-            <p:ph sz="half" idx="1"/>
-          </p:nvPr>
-        </p:nvSpPr>
-        <p:spPr/>
-        <p:txBody>
-          <a:bodyPr/>
-          <a:lstStyle/>
-          <a:p>
-            <a:r>
-              <a:rPr lang="en-US" sz="1800" dirty="0"/>
-              <a:t>Results</a:t>
-            </a:r>
-          </a:p>
-          <a:p>
-            <a:pPr lvl="1"/>
-            <a:r>
-              <a:rPr lang="en-US" sz="1400" dirty="0"/>
-              <a:t>Tennessee has the largest estimated intercept</a:t>
-            </a:r>
-          </a:p>
-          <a:p>
-            <a:pPr lvl="2"/>
-            <a:r>
-              <a:rPr lang="en-US" sz="1000" dirty="0"/>
-              <a:t>n = 57</a:t>
-            </a:r>
-          </a:p>
-          <a:p>
-            <a:pPr lvl="1"/>
-            <a:r>
-              <a:rPr lang="en-US" sz="1400" dirty="0"/>
-              <a:t>California has the lowest estimated intercept</a:t>
-            </a:r>
-          </a:p>
-          <a:p>
-            <a:pPr lvl="2"/>
-            <a:r>
-              <a:rPr lang="en-US" sz="1000" dirty="0"/>
-              <a:t>n = 259</a:t>
-            </a:r>
-            <a:endParaRPr lang="en-US" sz="1800" dirty="0"/>
-          </a:p>
-          <a:p>
-            <a:r>
-              <a:rPr lang="en-US" sz="1800" dirty="0"/>
-              <a:t>Future work</a:t>
-            </a:r>
-          </a:p>
-          <a:p>
-            <a:pPr lvl="1"/>
-            <a:r>
-              <a:rPr lang="en-US" sz="1400" dirty="0"/>
-              <a:t>Interactions</a:t>
-            </a:r>
-          </a:p>
-          <a:p>
-            <a:pPr lvl="1"/>
-            <a:r>
-              <a:rPr lang="en-US" sz="1400" dirty="0"/>
-              <a:t>Attempt to address violated assumptions</a:t>
-            </a:r>
-          </a:p>
-        </p:txBody>
-      </p:sp>
-      <p:sp>
-        <p:nvSpPr>
-          <p:cNvPr id="4" name="Slide Number Placeholder 3">
-            <a:extLst>
-              <a:ext uri="{FF2B5EF4-FFF2-40B4-BE49-F238E27FC236}">
-                <a16:creationId xmlns:a16="http://schemas.microsoft.com/office/drawing/2014/main" id="{05EDCFC6-B53C-4423-87DE-67A1B4861055}"/>
-              </a:ext>
-            </a:extLst>
-          </p:cNvPr>
-          <p:cNvSpPr>
-            <a:spLocks noGrp="1"/>
-          </p:cNvSpPr>
-          <p:nvPr>
-            <p:ph type="sldNum" sz="quarter" idx="12"/>
-          </p:nvPr>
-        </p:nvSpPr>
-        <p:spPr/>
-        <p:txBody>
-          <a:bodyPr wrap="square" anchor="t">
-            <a:normAutofit/>
-          </a:bodyPr>
-          <a:lstStyle/>
-          <a:p>
-            <a:pPr>
-              <a:lnSpc>
-                <a:spcPct val="90000"/>
-              </a:lnSpc>
-              <a:spcAft>
-                <a:spcPts val="600"/>
-              </a:spcAft>
-            </a:pPr>
-            <a:fld id="{4A93A190-6B22-4869-92A4-33F4DC54B357}" type="slidenum">
-              <a:rPr lang="ru-RU" altLang="ru-RU" sz="700" smtClean="0"/>
-              <a:pPr>
-                <a:lnSpc>
-                  <a:spcPct val="90000"/>
-                </a:lnSpc>
-                <a:spcAft>
-                  <a:spcPts val="600"/>
-                </a:spcAft>
-              </a:pPr>
-              <a:t>8</a:t>
-            </a:fld>
-            <a:endParaRPr lang="ru-RU" altLang="ru-RU" sz="700"/>
-          </a:p>
-        </p:txBody>
-      </p:sp>
-      <p:pic>
-        <p:nvPicPr>
-          <p:cNvPr id="12" name="Picture 11" descr="Chart&#10;&#10;Description automatically generated">
-            <a:extLst>
-              <a:ext uri="{FF2B5EF4-FFF2-40B4-BE49-F238E27FC236}">
-                <a16:creationId xmlns:a16="http://schemas.microsoft.com/office/drawing/2014/main" id="{6F6E8048-84FE-40E0-A553-98BB4E1391FB}"/>
-              </a:ext>
-            </a:extLst>
-          </p:cNvPr>
-          <p:cNvPicPr>
-            <a:picLocks noChangeAspect="1"/>
-          </p:cNvPicPr>
-          <p:nvPr/>
-        </p:nvPicPr>
-        <p:blipFill>
-          <a:blip r:embed="rId3">
-            <a:extLst>
-              <a:ext uri="{28A0092B-C50C-407E-A947-70E740481C1C}">
-                <a14:useLocalDpi xmlns:a14="http://schemas.microsoft.com/office/drawing/2010/main" val="0"/>
-              </a:ext>
-            </a:extLst>
-          </a:blip>
-          <a:stretch>
-            <a:fillRect/>
-          </a:stretch>
-        </p:blipFill>
-        <p:spPr>
-          <a:xfrm>
-            <a:off x="4932363" y="876660"/>
-            <a:ext cx="2958083" cy="4052168"/>
-          </a:xfrm>
-          <a:prstGeom prst="rect">
-            <a:avLst/>
-          </a:prstGeom>
-          <a:noFill/>
-        </p:spPr>
-      </p:pic>
-    </p:spTree>
-    <p:extLst>
-      <p:ext uri="{BB962C8B-B14F-4D97-AF65-F5344CB8AC3E}">
-        <p14:creationId xmlns:p14="http://schemas.microsoft.com/office/powerpoint/2010/main" val="1427774978"/>
       </p:ext>
     </p:extLst>
   </p:cSld>

</xml_diff>